<commit_message>
#7 : Class 변경에 따른 Class 설계서 수정 @1h
 To do Class 추가 및 하위 Class 수정
</commit_message>
<xml_diff>
--- a/3_설계서/Class Design.pptx
+++ b/3_설계서/Class Design.pptx
@@ -5,15 +5,18 @@
     <p:sldMasterId id="2147483655" r:id="rId1"/>
   </p:sldMasterIdLst>
   <p:notesMasterIdLst>
-    <p:notesMasterId r:id="rId5"/>
+    <p:notesMasterId r:id="rId8"/>
   </p:notesMasterIdLst>
   <p:handoutMasterIdLst>
-    <p:handoutMasterId r:id="rId6"/>
+    <p:handoutMasterId r:id="rId9"/>
   </p:handoutMasterIdLst>
   <p:sldIdLst>
     <p:sldId id="256" r:id="rId2"/>
     <p:sldId id="257" r:id="rId3"/>
     <p:sldId id="258" r:id="rId4"/>
+    <p:sldId id="259" r:id="rId5"/>
+    <p:sldId id="260" r:id="rId6"/>
+    <p:sldId id="261" r:id="rId7"/>
   </p:sldIdLst>
   <p:sldSz cx="9144000" cy="6858000" type="screen4x3"/>
   <p:notesSz cx="6797675" cy="9928225"/>
@@ -142,6 +145,41 @@
       </a:defRPr>
     </a:lvl9pPr>
   </p:defaultTextStyle>
+  <p:extLst>
+    <p:ext uri="{EFAFB233-063F-42B5-8137-9DF3F51BA10A}">
+      <p15:sldGuideLst xmlns:p15="http://schemas.microsoft.com/office/powerpoint/2012/main">
+        <p15:guide id="1" orient="horz">
+          <p15:clr>
+            <a:srgbClr val="A4A3A4"/>
+          </p15:clr>
+        </p15:guide>
+        <p15:guide id="2" pos="2880">
+          <p15:clr>
+            <a:srgbClr val="A4A3A4"/>
+          </p15:clr>
+        </p15:guide>
+        <p15:guide id="3" pos="6">
+          <p15:clr>
+            <a:srgbClr val="A4A3A4"/>
+          </p15:clr>
+        </p15:guide>
+      </p15:sldGuideLst>
+    </p:ext>
+    <p:ext uri="{2D200454-40CA-4A62-9FC3-DE9A4176ACB9}">
+      <p15:notesGuideLst xmlns:p15="http://schemas.microsoft.com/office/powerpoint/2012/main">
+        <p15:guide id="1" orient="horz" pos="3126">
+          <p15:clr>
+            <a:srgbClr val="A4A3A4"/>
+          </p15:clr>
+        </p15:guide>
+        <p15:guide id="2" pos="2140">
+          <p15:clr>
+            <a:srgbClr val="A4A3A4"/>
+          </p15:clr>
+        </p15:guide>
+      </p15:notesGuideLst>
+    </p:ext>
+  </p:extLst>
 </p:presentation>
 </file>
 
@@ -1090,10 +1128,34 @@
             <a:tbl>
               <a:tblPr/>
               <a:tblGrid>
-                <a:gridCol w="1022523"/>
-                <a:gridCol w="3439486"/>
-                <a:gridCol w="947956"/>
-                <a:gridCol w="3523377"/>
+                <a:gridCol w="1022523">
+                  <a:extLst>
+                    <a:ext uri="{9D8B030D-6E8A-4147-A177-3AD203B41FA5}">
+                      <a16:colId xmlns:a16="http://schemas.microsoft.com/office/drawing/2014/main" val="20000"/>
+                    </a:ext>
+                  </a:extLst>
+                </a:gridCol>
+                <a:gridCol w="3439486">
+                  <a:extLst>
+                    <a:ext uri="{9D8B030D-6E8A-4147-A177-3AD203B41FA5}">
+                      <a16:colId xmlns:a16="http://schemas.microsoft.com/office/drawing/2014/main" val="20001"/>
+                    </a:ext>
+                  </a:extLst>
+                </a:gridCol>
+                <a:gridCol w="947956">
+                  <a:extLst>
+                    <a:ext uri="{9D8B030D-6E8A-4147-A177-3AD203B41FA5}">
+                      <a16:colId xmlns:a16="http://schemas.microsoft.com/office/drawing/2014/main" val="20002"/>
+                    </a:ext>
+                  </a:extLst>
+                </a:gridCol>
+                <a:gridCol w="3523377">
+                  <a:extLst>
+                    <a:ext uri="{9D8B030D-6E8A-4147-A177-3AD203B41FA5}">
+                      <a16:colId xmlns:a16="http://schemas.microsoft.com/office/drawing/2014/main" val="20003"/>
+                    </a:ext>
+                  </a:extLst>
+                </a:gridCol>
               </a:tblGrid>
               <a:tr h="299619">
                 <a:tc rowSpan="2">
@@ -1476,6 +1538,11 @@
                     <a:noFill/>
                   </a:tcPr>
                 </a:tc>
+                <a:extLst>
+                  <a:ext uri="{0D108BD9-81ED-4DB2-BD59-A6C34878D82A}">
+                    <a16:rowId xmlns:a16="http://schemas.microsoft.com/office/drawing/2014/main" val="10000"/>
+                  </a:ext>
+                </a:extLst>
               </a:tr>
               <a:tr h="297106">
                 <a:tc vMerge="1">
@@ -1830,6 +1897,11 @@
                     <a:noFill/>
                   </a:tcPr>
                 </a:tc>
+                <a:extLst>
+                  <a:ext uri="{0D108BD9-81ED-4DB2-BD59-A6C34878D82A}">
+                    <a16:rowId xmlns:a16="http://schemas.microsoft.com/office/drawing/2014/main" val="10001"/>
+                  </a:ext>
+                </a:extLst>
               </a:tr>
             </a:tbl>
           </a:graphicData>
@@ -3108,10 +3180,34 @@
                 <a:tableStyleId>{5940675A-B579-460E-94D1-54222C63F5DA}</a:tableStyleId>
               </a:tblPr>
               <a:tblGrid>
-                <a:gridCol w="2145506"/>
-                <a:gridCol w="2145506"/>
-                <a:gridCol w="2145506"/>
-                <a:gridCol w="2145506"/>
+                <a:gridCol w="2145506">
+                  <a:extLst>
+                    <a:ext uri="{9D8B030D-6E8A-4147-A177-3AD203B41FA5}">
+                      <a16:colId xmlns:a16="http://schemas.microsoft.com/office/drawing/2014/main" val="20000"/>
+                    </a:ext>
+                  </a:extLst>
+                </a:gridCol>
+                <a:gridCol w="2145506">
+                  <a:extLst>
+                    <a:ext uri="{9D8B030D-6E8A-4147-A177-3AD203B41FA5}">
+                      <a16:colId xmlns:a16="http://schemas.microsoft.com/office/drawing/2014/main" val="20001"/>
+                    </a:ext>
+                  </a:extLst>
+                </a:gridCol>
+                <a:gridCol w="2145506">
+                  <a:extLst>
+                    <a:ext uri="{9D8B030D-6E8A-4147-A177-3AD203B41FA5}">
+                      <a16:colId xmlns:a16="http://schemas.microsoft.com/office/drawing/2014/main" val="20002"/>
+                    </a:ext>
+                  </a:extLst>
+                </a:gridCol>
+                <a:gridCol w="2145506">
+                  <a:extLst>
+                    <a:ext uri="{9D8B030D-6E8A-4147-A177-3AD203B41FA5}">
+                      <a16:colId xmlns:a16="http://schemas.microsoft.com/office/drawing/2014/main" val="20003"/>
+                    </a:ext>
+                  </a:extLst>
+                </a:gridCol>
               </a:tblGrid>
               <a:tr h="370840">
                 <a:tc>
@@ -3234,6 +3330,11 @@
                     </a:solidFill>
                   </a:tcPr>
                 </a:tc>
+                <a:extLst>
+                  <a:ext uri="{0D108BD9-81ED-4DB2-BD59-A6C34878D82A}">
+                    <a16:rowId xmlns:a16="http://schemas.microsoft.com/office/drawing/2014/main" val="10000"/>
+                  </a:ext>
+                </a:extLst>
               </a:tr>
               <a:tr h="370840">
                 <a:tc>
@@ -3320,6 +3421,11 @@
                     </a:solidFill>
                   </a:tcPr>
                 </a:tc>
+                <a:extLst>
+                  <a:ext uri="{0D108BD9-81ED-4DB2-BD59-A6C34878D82A}">
+                    <a16:rowId xmlns:a16="http://schemas.microsoft.com/office/drawing/2014/main" val="10001"/>
+                  </a:ext>
+                </a:extLst>
               </a:tr>
               <a:tr h="370840">
                 <a:tc>
@@ -3406,6 +3512,11 @@
                     </a:solidFill>
                   </a:tcPr>
                 </a:tc>
+                <a:extLst>
+                  <a:ext uri="{0D108BD9-81ED-4DB2-BD59-A6C34878D82A}">
+                    <a16:rowId xmlns:a16="http://schemas.microsoft.com/office/drawing/2014/main" val="10002"/>
+                  </a:ext>
+                </a:extLst>
               </a:tr>
               <a:tr h="370840">
                 <a:tc>
@@ -3492,6 +3603,11 @@
                     </a:solidFill>
                   </a:tcPr>
                 </a:tc>
+                <a:extLst>
+                  <a:ext uri="{0D108BD9-81ED-4DB2-BD59-A6C34878D82A}">
+                    <a16:rowId xmlns:a16="http://schemas.microsoft.com/office/drawing/2014/main" val="10003"/>
+                  </a:ext>
+                </a:extLst>
               </a:tr>
               <a:tr h="370840">
                 <a:tc>
@@ -3578,6 +3694,11 @@
                     </a:solidFill>
                   </a:tcPr>
                 </a:tc>
+                <a:extLst>
+                  <a:ext uri="{0D108BD9-81ED-4DB2-BD59-A6C34878D82A}">
+                    <a16:rowId xmlns:a16="http://schemas.microsoft.com/office/drawing/2014/main" val="10004"/>
+                  </a:ext>
+                </a:extLst>
               </a:tr>
               <a:tr h="370840">
                 <a:tc>
@@ -3664,6 +3785,11 @@
                     </a:solidFill>
                   </a:tcPr>
                 </a:tc>
+                <a:extLst>
+                  <a:ext uri="{0D108BD9-81ED-4DB2-BD59-A6C34878D82A}">
+                    <a16:rowId xmlns:a16="http://schemas.microsoft.com/office/drawing/2014/main" val="10005"/>
+                  </a:ext>
+                </a:extLst>
               </a:tr>
               <a:tr h="370840">
                 <a:tc>
@@ -3750,6 +3876,11 @@
                     </a:solidFill>
                   </a:tcPr>
                 </a:tc>
+                <a:extLst>
+                  <a:ext uri="{0D108BD9-81ED-4DB2-BD59-A6C34878D82A}">
+                    <a16:rowId xmlns:a16="http://schemas.microsoft.com/office/drawing/2014/main" val="10006"/>
+                  </a:ext>
+                </a:extLst>
               </a:tr>
               <a:tr h="370840">
                 <a:tc>
@@ -3836,6 +3967,11 @@
                     </a:solidFill>
                   </a:tcPr>
                 </a:tc>
+                <a:extLst>
+                  <a:ext uri="{0D108BD9-81ED-4DB2-BD59-A6C34878D82A}">
+                    <a16:rowId xmlns:a16="http://schemas.microsoft.com/office/drawing/2014/main" val="10007"/>
+                  </a:ext>
+                </a:extLst>
               </a:tr>
             </a:tbl>
           </a:graphicData>
@@ -3962,6 +4098,168 @@
         </p:spPr>
       </p:pic>
     </p:spTree>
+  </p:cSld>
+  <p:clrMapOvr>
+    <a:masterClrMapping/>
+  </p:clrMapOvr>
+</p:sld>
+</file>
+
+<file path=ppt/slides/slide4.xml><?xml version="1.0" encoding="utf-8"?>
+<p:sld xmlns:a="http://schemas.openxmlformats.org/drawingml/2006/main" xmlns:r="http://schemas.openxmlformats.org/officeDocument/2006/relationships" xmlns:p="http://schemas.openxmlformats.org/presentationml/2006/main">
+  <p:cSld>
+    <p:spTree>
+      <p:nvGrpSpPr>
+        <p:cNvPr id="1" name=""/>
+        <p:cNvGrpSpPr/>
+        <p:nvPr/>
+      </p:nvGrpSpPr>
+      <p:grpSpPr>
+        <a:xfrm>
+          <a:off x="0" y="0"/>
+          <a:ext cx="0" cy="0"/>
+          <a:chOff x="0" y="0"/>
+          <a:chExt cx="0" cy="0"/>
+        </a:xfrm>
+      </p:grpSpPr>
+      <p:sp>
+        <p:nvSpPr>
+          <p:cNvPr id="2" name="바닥글 개체 틀 1"/>
+          <p:cNvSpPr>
+            <a:spLocks noGrp="1"/>
+          </p:cNvSpPr>
+          <p:nvPr>
+            <p:ph type="ftr" sz="quarter" idx="3"/>
+          </p:nvPr>
+        </p:nvSpPr>
+        <p:spPr/>
+        <p:txBody>
+          <a:bodyPr/>
+          <a:lstStyle/>
+          <a:p>
+            <a:pPr algn="r"/>
+            <a:r>
+              <a:rPr lang="ko-KR" altLang="en-US" smtClean="0"/>
+              <a:t>팀 명</a:t>
+            </a:r>
+            <a:endParaRPr lang="en-US" altLang="ko-KR" dirty="0"/>
+          </a:p>
+        </p:txBody>
+      </p:sp>
+    </p:spTree>
+    <p:extLst>
+      <p:ext uri="{BB962C8B-B14F-4D97-AF65-F5344CB8AC3E}">
+        <p14:creationId xmlns:p14="http://schemas.microsoft.com/office/powerpoint/2010/main" val="1047478690"/>
+      </p:ext>
+    </p:extLst>
+  </p:cSld>
+  <p:clrMapOvr>
+    <a:masterClrMapping/>
+  </p:clrMapOvr>
+</p:sld>
+</file>
+
+<file path=ppt/slides/slide5.xml><?xml version="1.0" encoding="utf-8"?>
+<p:sld xmlns:a="http://schemas.openxmlformats.org/drawingml/2006/main" xmlns:r="http://schemas.openxmlformats.org/officeDocument/2006/relationships" xmlns:p="http://schemas.openxmlformats.org/presentationml/2006/main">
+  <p:cSld>
+    <p:spTree>
+      <p:nvGrpSpPr>
+        <p:cNvPr id="1" name=""/>
+        <p:cNvGrpSpPr/>
+        <p:nvPr/>
+      </p:nvGrpSpPr>
+      <p:grpSpPr>
+        <a:xfrm>
+          <a:off x="0" y="0"/>
+          <a:ext cx="0" cy="0"/>
+          <a:chOff x="0" y="0"/>
+          <a:chExt cx="0" cy="0"/>
+        </a:xfrm>
+      </p:grpSpPr>
+      <p:sp>
+        <p:nvSpPr>
+          <p:cNvPr id="2" name="바닥글 개체 틀 1"/>
+          <p:cNvSpPr>
+            <a:spLocks noGrp="1"/>
+          </p:cNvSpPr>
+          <p:nvPr>
+            <p:ph type="ftr" sz="quarter" idx="3"/>
+          </p:nvPr>
+        </p:nvSpPr>
+        <p:spPr/>
+        <p:txBody>
+          <a:bodyPr/>
+          <a:lstStyle/>
+          <a:p>
+            <a:pPr algn="r"/>
+            <a:r>
+              <a:rPr lang="ko-KR" altLang="en-US" smtClean="0"/>
+              <a:t>팀 명</a:t>
+            </a:r>
+            <a:endParaRPr lang="en-US" altLang="ko-KR" dirty="0"/>
+          </a:p>
+        </p:txBody>
+      </p:sp>
+    </p:spTree>
+    <p:extLst>
+      <p:ext uri="{BB962C8B-B14F-4D97-AF65-F5344CB8AC3E}">
+        <p14:creationId xmlns:p14="http://schemas.microsoft.com/office/powerpoint/2010/main" val="3198967709"/>
+      </p:ext>
+    </p:extLst>
+  </p:cSld>
+  <p:clrMapOvr>
+    <a:masterClrMapping/>
+  </p:clrMapOvr>
+</p:sld>
+</file>
+
+<file path=ppt/slides/slide6.xml><?xml version="1.0" encoding="utf-8"?>
+<p:sld xmlns:a="http://schemas.openxmlformats.org/drawingml/2006/main" xmlns:r="http://schemas.openxmlformats.org/officeDocument/2006/relationships" xmlns:p="http://schemas.openxmlformats.org/presentationml/2006/main">
+  <p:cSld>
+    <p:spTree>
+      <p:nvGrpSpPr>
+        <p:cNvPr id="1" name=""/>
+        <p:cNvGrpSpPr/>
+        <p:nvPr/>
+      </p:nvGrpSpPr>
+      <p:grpSpPr>
+        <a:xfrm>
+          <a:off x="0" y="0"/>
+          <a:ext cx="0" cy="0"/>
+          <a:chOff x="0" y="0"/>
+          <a:chExt cx="0" cy="0"/>
+        </a:xfrm>
+      </p:grpSpPr>
+      <p:sp>
+        <p:nvSpPr>
+          <p:cNvPr id="2" name="바닥글 개체 틀 1"/>
+          <p:cNvSpPr>
+            <a:spLocks noGrp="1"/>
+          </p:cNvSpPr>
+          <p:nvPr>
+            <p:ph type="ftr" sz="quarter" idx="3"/>
+          </p:nvPr>
+        </p:nvSpPr>
+        <p:spPr/>
+        <p:txBody>
+          <a:bodyPr/>
+          <a:lstStyle/>
+          <a:p>
+            <a:pPr algn="r"/>
+            <a:r>
+              <a:rPr lang="ko-KR" altLang="en-US" smtClean="0"/>
+              <a:t>팀 명</a:t>
+            </a:r>
+            <a:endParaRPr lang="en-US" altLang="ko-KR" dirty="0"/>
+          </a:p>
+        </p:txBody>
+      </p:sp>
+    </p:spTree>
+    <p:extLst>
+      <p:ext uri="{BB962C8B-B14F-4D97-AF65-F5344CB8AC3E}">
+        <p14:creationId xmlns:p14="http://schemas.microsoft.com/office/powerpoint/2010/main" val="3653490167"/>
+      </p:ext>
+    </p:extLst>
   </p:cSld>
   <p:clrMapOvr>
     <a:masterClrMapping/>

</xml_diff>

<commit_message>
fixed #7 : 설계서 v1.0 작성 완료 @7h
</commit_message>
<xml_diff>
--- a/3_설계서/Class Design.pptx
+++ b/3_설계서/Class Design.pptx
@@ -5,10 +5,10 @@
     <p:sldMasterId id="2147483655" r:id="rId1"/>
   </p:sldMasterIdLst>
   <p:notesMasterIdLst>
-    <p:notesMasterId r:id="rId10"/>
+    <p:notesMasterId r:id="rId13"/>
   </p:notesMasterIdLst>
   <p:handoutMasterIdLst>
-    <p:handoutMasterId r:id="rId11"/>
+    <p:handoutMasterId r:id="rId14"/>
   </p:handoutMasterIdLst>
   <p:sldIdLst>
     <p:sldId id="256" r:id="rId2"/>
@@ -16,9 +16,12 @@
     <p:sldId id="258" r:id="rId4"/>
     <p:sldId id="259" r:id="rId5"/>
     <p:sldId id="262" r:id="rId6"/>
-    <p:sldId id="263" r:id="rId7"/>
-    <p:sldId id="260" r:id="rId8"/>
-    <p:sldId id="261" r:id="rId9"/>
+    <p:sldId id="264" r:id="rId7"/>
+    <p:sldId id="265" r:id="rId8"/>
+    <p:sldId id="266" r:id="rId9"/>
+    <p:sldId id="263" r:id="rId10"/>
+    <p:sldId id="260" r:id="rId11"/>
+    <p:sldId id="261" r:id="rId12"/>
   </p:sldIdLst>
   <p:sldSz cx="9144000" cy="6858000" type="screen4x3"/>
   <p:notesSz cx="6797675" cy="9928225"/>
@@ -3092,6 +3095,114 @@
 </p:sld>
 </file>
 
+<file path=ppt/slides/slide10.xml><?xml version="1.0" encoding="utf-8"?>
+<p:sld xmlns:a="http://schemas.openxmlformats.org/drawingml/2006/main" xmlns:r="http://schemas.openxmlformats.org/officeDocument/2006/relationships" xmlns:p="http://schemas.openxmlformats.org/presentationml/2006/main">
+  <p:cSld>
+    <p:spTree>
+      <p:nvGrpSpPr>
+        <p:cNvPr id="1" name=""/>
+        <p:cNvGrpSpPr/>
+        <p:nvPr/>
+      </p:nvGrpSpPr>
+      <p:grpSpPr>
+        <a:xfrm>
+          <a:off x="0" y="0"/>
+          <a:ext cx="0" cy="0"/>
+          <a:chOff x="0" y="0"/>
+          <a:chExt cx="0" cy="0"/>
+        </a:xfrm>
+      </p:grpSpPr>
+      <p:sp>
+        <p:nvSpPr>
+          <p:cNvPr id="2" name="바닥글 개체 틀 1"/>
+          <p:cNvSpPr>
+            <a:spLocks noGrp="1"/>
+          </p:cNvSpPr>
+          <p:nvPr>
+            <p:ph type="ftr" sz="quarter" idx="3"/>
+          </p:nvPr>
+        </p:nvSpPr>
+        <p:spPr/>
+        <p:txBody>
+          <a:bodyPr/>
+          <a:lstStyle/>
+          <a:p>
+            <a:pPr algn="r"/>
+            <a:r>
+              <a:rPr lang="ko-KR" altLang="en-US" smtClean="0"/>
+              <a:t>팀 명</a:t>
+            </a:r>
+            <a:endParaRPr lang="en-US" altLang="ko-KR" dirty="0"/>
+          </a:p>
+        </p:txBody>
+      </p:sp>
+    </p:spTree>
+    <p:extLst>
+      <p:ext uri="{BB962C8B-B14F-4D97-AF65-F5344CB8AC3E}">
+        <p14:creationId xmlns:p14="http://schemas.microsoft.com/office/powerpoint/2010/main" val="3198967709"/>
+      </p:ext>
+    </p:extLst>
+  </p:cSld>
+  <p:clrMapOvr>
+    <a:masterClrMapping/>
+  </p:clrMapOvr>
+</p:sld>
+</file>
+
+<file path=ppt/slides/slide11.xml><?xml version="1.0" encoding="utf-8"?>
+<p:sld xmlns:a="http://schemas.openxmlformats.org/drawingml/2006/main" xmlns:r="http://schemas.openxmlformats.org/officeDocument/2006/relationships" xmlns:p="http://schemas.openxmlformats.org/presentationml/2006/main">
+  <p:cSld>
+    <p:spTree>
+      <p:nvGrpSpPr>
+        <p:cNvPr id="1" name=""/>
+        <p:cNvGrpSpPr/>
+        <p:nvPr/>
+      </p:nvGrpSpPr>
+      <p:grpSpPr>
+        <a:xfrm>
+          <a:off x="0" y="0"/>
+          <a:ext cx="0" cy="0"/>
+          <a:chOff x="0" y="0"/>
+          <a:chExt cx="0" cy="0"/>
+        </a:xfrm>
+      </p:grpSpPr>
+      <p:sp>
+        <p:nvSpPr>
+          <p:cNvPr id="2" name="바닥글 개체 틀 1"/>
+          <p:cNvSpPr>
+            <a:spLocks noGrp="1"/>
+          </p:cNvSpPr>
+          <p:nvPr>
+            <p:ph type="ftr" sz="quarter" idx="3"/>
+          </p:nvPr>
+        </p:nvSpPr>
+        <p:spPr/>
+        <p:txBody>
+          <a:bodyPr/>
+          <a:lstStyle/>
+          <a:p>
+            <a:pPr algn="r"/>
+            <a:r>
+              <a:rPr lang="ko-KR" altLang="en-US" smtClean="0"/>
+              <a:t>팀 명</a:t>
+            </a:r>
+            <a:endParaRPr lang="en-US" altLang="ko-KR" dirty="0"/>
+          </a:p>
+        </p:txBody>
+      </p:sp>
+    </p:spTree>
+    <p:extLst>
+      <p:ext uri="{BB962C8B-B14F-4D97-AF65-F5344CB8AC3E}">
+        <p14:creationId xmlns:p14="http://schemas.microsoft.com/office/powerpoint/2010/main" val="3653490167"/>
+      </p:ext>
+    </p:extLst>
+  </p:cSld>
+  <p:clrMapOvr>
+    <a:masterClrMapping/>
+  </p:clrMapOvr>
+</p:sld>
+</file>
+
 <file path=ppt/slides/slide2.xml><?xml version="1.0" encoding="utf-8"?>
 <p:sld xmlns:a="http://schemas.openxmlformats.org/drawingml/2006/main" xmlns:r="http://schemas.openxmlformats.org/officeDocument/2006/relationships" xmlns:p="http://schemas.openxmlformats.org/presentationml/2006/main">
   <p:cSld>
@@ -4259,7 +4370,7 @@
     </p:spTree>
     <p:extLst>
       <p:ext uri="{BB962C8B-B14F-4D97-AF65-F5344CB8AC3E}">
-        <p14:creationId xmlns:p14="http://schemas.microsoft.com/office/powerpoint/2010/main" val="4121032524"/>
+        <p14:creationId xmlns:p14="http://schemas.microsoft.com/office/powerpoint/2010/main" val="1745426124"/>
       </p:ext>
     </p:extLst>
   </p:cSld>
@@ -4313,7 +4424,7 @@
     </p:spTree>
     <p:extLst>
       <p:ext uri="{BB962C8B-B14F-4D97-AF65-F5344CB8AC3E}">
-        <p14:creationId xmlns:p14="http://schemas.microsoft.com/office/powerpoint/2010/main" val="3198967709"/>
+        <p14:creationId xmlns:p14="http://schemas.microsoft.com/office/powerpoint/2010/main" val="1522769242"/>
       </p:ext>
     </p:extLst>
   </p:cSld>
@@ -4367,7 +4478,61 @@
     </p:spTree>
     <p:extLst>
       <p:ext uri="{BB962C8B-B14F-4D97-AF65-F5344CB8AC3E}">
-        <p14:creationId xmlns:p14="http://schemas.microsoft.com/office/powerpoint/2010/main" val="3653490167"/>
+        <p14:creationId xmlns:p14="http://schemas.microsoft.com/office/powerpoint/2010/main" val="80976357"/>
+      </p:ext>
+    </p:extLst>
+  </p:cSld>
+  <p:clrMapOvr>
+    <a:masterClrMapping/>
+  </p:clrMapOvr>
+</p:sld>
+</file>
+
+<file path=ppt/slides/slide9.xml><?xml version="1.0" encoding="utf-8"?>
+<p:sld xmlns:a="http://schemas.openxmlformats.org/drawingml/2006/main" xmlns:r="http://schemas.openxmlformats.org/officeDocument/2006/relationships" xmlns:p="http://schemas.openxmlformats.org/presentationml/2006/main">
+  <p:cSld>
+    <p:spTree>
+      <p:nvGrpSpPr>
+        <p:cNvPr id="1" name=""/>
+        <p:cNvGrpSpPr/>
+        <p:nvPr/>
+      </p:nvGrpSpPr>
+      <p:grpSpPr>
+        <a:xfrm>
+          <a:off x="0" y="0"/>
+          <a:ext cx="0" cy="0"/>
+          <a:chOff x="0" y="0"/>
+          <a:chExt cx="0" cy="0"/>
+        </a:xfrm>
+      </p:grpSpPr>
+      <p:sp>
+        <p:nvSpPr>
+          <p:cNvPr id="2" name="바닥글 개체 틀 1"/>
+          <p:cNvSpPr>
+            <a:spLocks noGrp="1"/>
+          </p:cNvSpPr>
+          <p:nvPr>
+            <p:ph type="ftr" sz="quarter" idx="3"/>
+          </p:nvPr>
+        </p:nvSpPr>
+        <p:spPr/>
+        <p:txBody>
+          <a:bodyPr/>
+          <a:lstStyle/>
+          <a:p>
+            <a:pPr algn="r"/>
+            <a:r>
+              <a:rPr lang="ko-KR" altLang="en-US" smtClean="0"/>
+              <a:t>팀 명</a:t>
+            </a:r>
+            <a:endParaRPr lang="en-US" altLang="ko-KR" dirty="0"/>
+          </a:p>
+        </p:txBody>
+      </p:sp>
+    </p:spTree>
+    <p:extLst>
+      <p:ext uri="{BB962C8B-B14F-4D97-AF65-F5344CB8AC3E}">
+        <p14:creationId xmlns:p14="http://schemas.microsoft.com/office/powerpoint/2010/main" val="4121032524"/>
       </p:ext>
     </p:extLst>
   </p:cSld>

</xml_diff>

<commit_message>
progress #7 설계서 수정
</commit_message>
<xml_diff>
--- a/3_설계서/Class Design.pptx
+++ b/3_설계서/Class Design.pptx
@@ -5,23 +5,17 @@
     <p:sldMasterId id="2147483655" r:id="rId1"/>
   </p:sldMasterIdLst>
   <p:notesMasterIdLst>
-    <p:notesMasterId r:id="rId13"/>
+    <p:notesMasterId r:id="rId7"/>
   </p:notesMasterIdLst>
   <p:handoutMasterIdLst>
-    <p:handoutMasterId r:id="rId14"/>
+    <p:handoutMasterId r:id="rId8"/>
   </p:handoutMasterIdLst>
   <p:sldIdLst>
     <p:sldId id="256" r:id="rId2"/>
     <p:sldId id="257" r:id="rId3"/>
     <p:sldId id="258" r:id="rId4"/>
-    <p:sldId id="259" r:id="rId5"/>
-    <p:sldId id="262" r:id="rId6"/>
-    <p:sldId id="264" r:id="rId7"/>
-    <p:sldId id="265" r:id="rId8"/>
-    <p:sldId id="266" r:id="rId9"/>
-    <p:sldId id="263" r:id="rId10"/>
-    <p:sldId id="260" r:id="rId11"/>
-    <p:sldId id="261" r:id="rId12"/>
+    <p:sldId id="260" r:id="rId5"/>
+    <p:sldId id="261" r:id="rId6"/>
   </p:sldIdLst>
   <p:sldSz cx="9144000" cy="6858000" type="screen4x3"/>
   <p:notesSz cx="6797675" cy="9928225"/>
@@ -3095,114 +3089,6 @@
 </p:sld>
 </file>
 
-<file path=ppt/slides/slide10.xml><?xml version="1.0" encoding="utf-8"?>
-<p:sld xmlns:a="http://schemas.openxmlformats.org/drawingml/2006/main" xmlns:r="http://schemas.openxmlformats.org/officeDocument/2006/relationships" xmlns:p="http://schemas.openxmlformats.org/presentationml/2006/main">
-  <p:cSld>
-    <p:spTree>
-      <p:nvGrpSpPr>
-        <p:cNvPr id="1" name=""/>
-        <p:cNvGrpSpPr/>
-        <p:nvPr/>
-      </p:nvGrpSpPr>
-      <p:grpSpPr>
-        <a:xfrm>
-          <a:off x="0" y="0"/>
-          <a:ext cx="0" cy="0"/>
-          <a:chOff x="0" y="0"/>
-          <a:chExt cx="0" cy="0"/>
-        </a:xfrm>
-      </p:grpSpPr>
-      <p:sp>
-        <p:nvSpPr>
-          <p:cNvPr id="2" name="바닥글 개체 틀 1"/>
-          <p:cNvSpPr>
-            <a:spLocks noGrp="1"/>
-          </p:cNvSpPr>
-          <p:nvPr>
-            <p:ph type="ftr" sz="quarter" idx="3"/>
-          </p:nvPr>
-        </p:nvSpPr>
-        <p:spPr/>
-        <p:txBody>
-          <a:bodyPr/>
-          <a:lstStyle/>
-          <a:p>
-            <a:pPr algn="r"/>
-            <a:r>
-              <a:rPr lang="ko-KR" altLang="en-US" smtClean="0"/>
-              <a:t>팀 명</a:t>
-            </a:r>
-            <a:endParaRPr lang="en-US" altLang="ko-KR" dirty="0"/>
-          </a:p>
-        </p:txBody>
-      </p:sp>
-    </p:spTree>
-    <p:extLst>
-      <p:ext uri="{BB962C8B-B14F-4D97-AF65-F5344CB8AC3E}">
-        <p14:creationId xmlns:p14="http://schemas.microsoft.com/office/powerpoint/2010/main" val="3198967709"/>
-      </p:ext>
-    </p:extLst>
-  </p:cSld>
-  <p:clrMapOvr>
-    <a:masterClrMapping/>
-  </p:clrMapOvr>
-</p:sld>
-</file>
-
-<file path=ppt/slides/slide11.xml><?xml version="1.0" encoding="utf-8"?>
-<p:sld xmlns:a="http://schemas.openxmlformats.org/drawingml/2006/main" xmlns:r="http://schemas.openxmlformats.org/officeDocument/2006/relationships" xmlns:p="http://schemas.openxmlformats.org/presentationml/2006/main">
-  <p:cSld>
-    <p:spTree>
-      <p:nvGrpSpPr>
-        <p:cNvPr id="1" name=""/>
-        <p:cNvGrpSpPr/>
-        <p:nvPr/>
-      </p:nvGrpSpPr>
-      <p:grpSpPr>
-        <a:xfrm>
-          <a:off x="0" y="0"/>
-          <a:ext cx="0" cy="0"/>
-          <a:chOff x="0" y="0"/>
-          <a:chExt cx="0" cy="0"/>
-        </a:xfrm>
-      </p:grpSpPr>
-      <p:sp>
-        <p:nvSpPr>
-          <p:cNvPr id="2" name="바닥글 개체 틀 1"/>
-          <p:cNvSpPr>
-            <a:spLocks noGrp="1"/>
-          </p:cNvSpPr>
-          <p:nvPr>
-            <p:ph type="ftr" sz="quarter" idx="3"/>
-          </p:nvPr>
-        </p:nvSpPr>
-        <p:spPr/>
-        <p:txBody>
-          <a:bodyPr/>
-          <a:lstStyle/>
-          <a:p>
-            <a:pPr algn="r"/>
-            <a:r>
-              <a:rPr lang="ko-KR" altLang="en-US" smtClean="0"/>
-              <a:t>팀 명</a:t>
-            </a:r>
-            <a:endParaRPr lang="en-US" altLang="ko-KR" dirty="0"/>
-          </a:p>
-        </p:txBody>
-      </p:sp>
-    </p:spTree>
-    <p:extLst>
-      <p:ext uri="{BB962C8B-B14F-4D97-AF65-F5344CB8AC3E}">
-        <p14:creationId xmlns:p14="http://schemas.microsoft.com/office/powerpoint/2010/main" val="3653490167"/>
-      </p:ext>
-    </p:extLst>
-  </p:cSld>
-  <p:clrMapOvr>
-    <a:masterClrMapping/>
-  </p:clrMapOvr>
-</p:sld>
-</file>
-
 <file path=ppt/slides/slide2.xml><?xml version="1.0" encoding="utf-8"?>
 <p:sld xmlns:a="http://schemas.openxmlformats.org/drawingml/2006/main" xmlns:r="http://schemas.openxmlformats.org/officeDocument/2006/relationships" xmlns:p="http://schemas.openxmlformats.org/presentationml/2006/main">
   <p:cSld>
@@ -4262,7 +4148,7 @@
     </p:spTree>
     <p:extLst>
       <p:ext uri="{BB962C8B-B14F-4D97-AF65-F5344CB8AC3E}">
-        <p14:creationId xmlns:p14="http://schemas.microsoft.com/office/powerpoint/2010/main" val="1047478690"/>
+        <p14:creationId xmlns:p14="http://schemas.microsoft.com/office/powerpoint/2010/main" val="3198967709"/>
       </p:ext>
     </p:extLst>
   </p:cSld>
@@ -4316,223 +4202,7 @@
     </p:spTree>
     <p:extLst>
       <p:ext uri="{BB962C8B-B14F-4D97-AF65-F5344CB8AC3E}">
-        <p14:creationId xmlns:p14="http://schemas.microsoft.com/office/powerpoint/2010/main" val="3315491223"/>
-      </p:ext>
-    </p:extLst>
-  </p:cSld>
-  <p:clrMapOvr>
-    <a:masterClrMapping/>
-  </p:clrMapOvr>
-</p:sld>
-</file>
-
-<file path=ppt/slides/slide6.xml><?xml version="1.0" encoding="utf-8"?>
-<p:sld xmlns:a="http://schemas.openxmlformats.org/drawingml/2006/main" xmlns:r="http://schemas.openxmlformats.org/officeDocument/2006/relationships" xmlns:p="http://schemas.openxmlformats.org/presentationml/2006/main">
-  <p:cSld>
-    <p:spTree>
-      <p:nvGrpSpPr>
-        <p:cNvPr id="1" name=""/>
-        <p:cNvGrpSpPr/>
-        <p:nvPr/>
-      </p:nvGrpSpPr>
-      <p:grpSpPr>
-        <a:xfrm>
-          <a:off x="0" y="0"/>
-          <a:ext cx="0" cy="0"/>
-          <a:chOff x="0" y="0"/>
-          <a:chExt cx="0" cy="0"/>
-        </a:xfrm>
-      </p:grpSpPr>
-      <p:sp>
-        <p:nvSpPr>
-          <p:cNvPr id="2" name="바닥글 개체 틀 1"/>
-          <p:cNvSpPr>
-            <a:spLocks noGrp="1"/>
-          </p:cNvSpPr>
-          <p:nvPr>
-            <p:ph type="ftr" sz="quarter" idx="3"/>
-          </p:nvPr>
-        </p:nvSpPr>
-        <p:spPr/>
-        <p:txBody>
-          <a:bodyPr/>
-          <a:lstStyle/>
-          <a:p>
-            <a:pPr algn="r"/>
-            <a:r>
-              <a:rPr lang="ko-KR" altLang="en-US" smtClean="0"/>
-              <a:t>팀 명</a:t>
-            </a:r>
-            <a:endParaRPr lang="en-US" altLang="ko-KR" dirty="0"/>
-          </a:p>
-        </p:txBody>
-      </p:sp>
-    </p:spTree>
-    <p:extLst>
-      <p:ext uri="{BB962C8B-B14F-4D97-AF65-F5344CB8AC3E}">
-        <p14:creationId xmlns:p14="http://schemas.microsoft.com/office/powerpoint/2010/main" val="1745426124"/>
-      </p:ext>
-    </p:extLst>
-  </p:cSld>
-  <p:clrMapOvr>
-    <a:masterClrMapping/>
-  </p:clrMapOvr>
-</p:sld>
-</file>
-
-<file path=ppt/slides/slide7.xml><?xml version="1.0" encoding="utf-8"?>
-<p:sld xmlns:a="http://schemas.openxmlformats.org/drawingml/2006/main" xmlns:r="http://schemas.openxmlformats.org/officeDocument/2006/relationships" xmlns:p="http://schemas.openxmlformats.org/presentationml/2006/main">
-  <p:cSld>
-    <p:spTree>
-      <p:nvGrpSpPr>
-        <p:cNvPr id="1" name=""/>
-        <p:cNvGrpSpPr/>
-        <p:nvPr/>
-      </p:nvGrpSpPr>
-      <p:grpSpPr>
-        <a:xfrm>
-          <a:off x="0" y="0"/>
-          <a:ext cx="0" cy="0"/>
-          <a:chOff x="0" y="0"/>
-          <a:chExt cx="0" cy="0"/>
-        </a:xfrm>
-      </p:grpSpPr>
-      <p:sp>
-        <p:nvSpPr>
-          <p:cNvPr id="2" name="바닥글 개체 틀 1"/>
-          <p:cNvSpPr>
-            <a:spLocks noGrp="1"/>
-          </p:cNvSpPr>
-          <p:nvPr>
-            <p:ph type="ftr" sz="quarter" idx="3"/>
-          </p:nvPr>
-        </p:nvSpPr>
-        <p:spPr/>
-        <p:txBody>
-          <a:bodyPr/>
-          <a:lstStyle/>
-          <a:p>
-            <a:pPr algn="r"/>
-            <a:r>
-              <a:rPr lang="ko-KR" altLang="en-US" smtClean="0"/>
-              <a:t>팀 명</a:t>
-            </a:r>
-            <a:endParaRPr lang="en-US" altLang="ko-KR" dirty="0"/>
-          </a:p>
-        </p:txBody>
-      </p:sp>
-    </p:spTree>
-    <p:extLst>
-      <p:ext uri="{BB962C8B-B14F-4D97-AF65-F5344CB8AC3E}">
-        <p14:creationId xmlns:p14="http://schemas.microsoft.com/office/powerpoint/2010/main" val="1522769242"/>
-      </p:ext>
-    </p:extLst>
-  </p:cSld>
-  <p:clrMapOvr>
-    <a:masterClrMapping/>
-  </p:clrMapOvr>
-</p:sld>
-</file>
-
-<file path=ppt/slides/slide8.xml><?xml version="1.0" encoding="utf-8"?>
-<p:sld xmlns:a="http://schemas.openxmlformats.org/drawingml/2006/main" xmlns:r="http://schemas.openxmlformats.org/officeDocument/2006/relationships" xmlns:p="http://schemas.openxmlformats.org/presentationml/2006/main">
-  <p:cSld>
-    <p:spTree>
-      <p:nvGrpSpPr>
-        <p:cNvPr id="1" name=""/>
-        <p:cNvGrpSpPr/>
-        <p:nvPr/>
-      </p:nvGrpSpPr>
-      <p:grpSpPr>
-        <a:xfrm>
-          <a:off x="0" y="0"/>
-          <a:ext cx="0" cy="0"/>
-          <a:chOff x="0" y="0"/>
-          <a:chExt cx="0" cy="0"/>
-        </a:xfrm>
-      </p:grpSpPr>
-      <p:sp>
-        <p:nvSpPr>
-          <p:cNvPr id="2" name="바닥글 개체 틀 1"/>
-          <p:cNvSpPr>
-            <a:spLocks noGrp="1"/>
-          </p:cNvSpPr>
-          <p:nvPr>
-            <p:ph type="ftr" sz="quarter" idx="3"/>
-          </p:nvPr>
-        </p:nvSpPr>
-        <p:spPr/>
-        <p:txBody>
-          <a:bodyPr/>
-          <a:lstStyle/>
-          <a:p>
-            <a:pPr algn="r"/>
-            <a:r>
-              <a:rPr lang="ko-KR" altLang="en-US" smtClean="0"/>
-              <a:t>팀 명</a:t>
-            </a:r>
-            <a:endParaRPr lang="en-US" altLang="ko-KR" dirty="0"/>
-          </a:p>
-        </p:txBody>
-      </p:sp>
-    </p:spTree>
-    <p:extLst>
-      <p:ext uri="{BB962C8B-B14F-4D97-AF65-F5344CB8AC3E}">
-        <p14:creationId xmlns:p14="http://schemas.microsoft.com/office/powerpoint/2010/main" val="80976357"/>
-      </p:ext>
-    </p:extLst>
-  </p:cSld>
-  <p:clrMapOvr>
-    <a:masterClrMapping/>
-  </p:clrMapOvr>
-</p:sld>
-</file>
-
-<file path=ppt/slides/slide9.xml><?xml version="1.0" encoding="utf-8"?>
-<p:sld xmlns:a="http://schemas.openxmlformats.org/drawingml/2006/main" xmlns:r="http://schemas.openxmlformats.org/officeDocument/2006/relationships" xmlns:p="http://schemas.openxmlformats.org/presentationml/2006/main">
-  <p:cSld>
-    <p:spTree>
-      <p:nvGrpSpPr>
-        <p:cNvPr id="1" name=""/>
-        <p:cNvGrpSpPr/>
-        <p:nvPr/>
-      </p:nvGrpSpPr>
-      <p:grpSpPr>
-        <a:xfrm>
-          <a:off x="0" y="0"/>
-          <a:ext cx="0" cy="0"/>
-          <a:chOff x="0" y="0"/>
-          <a:chExt cx="0" cy="0"/>
-        </a:xfrm>
-      </p:grpSpPr>
-      <p:sp>
-        <p:nvSpPr>
-          <p:cNvPr id="2" name="바닥글 개체 틀 1"/>
-          <p:cNvSpPr>
-            <a:spLocks noGrp="1"/>
-          </p:cNvSpPr>
-          <p:nvPr>
-            <p:ph type="ftr" sz="quarter" idx="3"/>
-          </p:nvPr>
-        </p:nvSpPr>
-        <p:spPr/>
-        <p:txBody>
-          <a:bodyPr/>
-          <a:lstStyle/>
-          <a:p>
-            <a:pPr algn="r"/>
-            <a:r>
-              <a:rPr lang="ko-KR" altLang="en-US" smtClean="0"/>
-              <a:t>팀 명</a:t>
-            </a:r>
-            <a:endParaRPr lang="en-US" altLang="ko-KR" dirty="0"/>
-          </a:p>
-        </p:txBody>
-      </p:sp>
-    </p:spTree>
-    <p:extLst>
-      <p:ext uri="{BB962C8B-B14F-4D97-AF65-F5344CB8AC3E}">
-        <p14:creationId xmlns:p14="http://schemas.microsoft.com/office/powerpoint/2010/main" val="4121032524"/>
+        <p14:creationId xmlns:p14="http://schemas.microsoft.com/office/powerpoint/2010/main" val="3653490167"/>
       </p:ext>
     </p:extLst>
   </p:cSld>

</xml_diff>